<commit_message>
vNext complete, except still need to regenerate git tree
</commit_message>
<xml_diff>
--- a/src/CV_AlexYates_EMEA_vNext.pptx
+++ b/src/CV_AlexYates_EMEA_vNext.pptx
@@ -242,7 +242,7 @@
           <a:p>
             <a:fld id="{335876D0-9B75-44B5-9404-8FDAD3FB5281}" type="datetimeFigureOut">
               <a:rPr lang="en-GB" smtClean="0"/>
-              <a:t>25/10/2022</a:t>
+              <a:t>26/10/2022</a:t>
             </a:fld>
             <a:endParaRPr lang="en-GB"/>
           </a:p>
@@ -412,7 +412,7 @@
           <a:p>
             <a:fld id="{335876D0-9B75-44B5-9404-8FDAD3FB5281}" type="datetimeFigureOut">
               <a:rPr lang="en-GB" smtClean="0"/>
-              <a:t>25/10/2022</a:t>
+              <a:t>26/10/2022</a:t>
             </a:fld>
             <a:endParaRPr lang="en-GB"/>
           </a:p>
@@ -592,7 +592,7 @@
           <a:p>
             <a:fld id="{335876D0-9B75-44B5-9404-8FDAD3FB5281}" type="datetimeFigureOut">
               <a:rPr lang="en-GB" smtClean="0"/>
-              <a:t>25/10/2022</a:t>
+              <a:t>26/10/2022</a:t>
             </a:fld>
             <a:endParaRPr lang="en-GB"/>
           </a:p>
@@ -768,7 +768,7 @@
           <a:p>
             <a:fld id="{335876D0-9B75-44B5-9404-8FDAD3FB5281}" type="datetimeFigureOut">
               <a:rPr lang="en-GB" smtClean="0"/>
-              <a:t>25/10/2022</a:t>
+              <a:t>26/10/2022</a:t>
             </a:fld>
             <a:endParaRPr lang="en-GB"/>
           </a:p>
@@ -1012,7 +1012,7 @@
           <a:p>
             <a:fld id="{335876D0-9B75-44B5-9404-8FDAD3FB5281}" type="datetimeFigureOut">
               <a:rPr lang="en-GB" smtClean="0"/>
-              <a:t>25/10/2022</a:t>
+              <a:t>26/10/2022</a:t>
             </a:fld>
             <a:endParaRPr lang="en-GB"/>
           </a:p>
@@ -1244,7 +1244,7 @@
           <a:p>
             <a:fld id="{335876D0-9B75-44B5-9404-8FDAD3FB5281}" type="datetimeFigureOut">
               <a:rPr lang="en-GB" smtClean="0"/>
-              <a:t>25/10/2022</a:t>
+              <a:t>26/10/2022</a:t>
             </a:fld>
             <a:endParaRPr lang="en-GB"/>
           </a:p>
@@ -1611,7 +1611,7 @@
           <a:p>
             <a:fld id="{335876D0-9B75-44B5-9404-8FDAD3FB5281}" type="datetimeFigureOut">
               <a:rPr lang="en-GB" smtClean="0"/>
-              <a:t>25/10/2022</a:t>
+              <a:t>26/10/2022</a:t>
             </a:fld>
             <a:endParaRPr lang="en-GB"/>
           </a:p>
@@ -1729,7 +1729,7 @@
           <a:p>
             <a:fld id="{335876D0-9B75-44B5-9404-8FDAD3FB5281}" type="datetimeFigureOut">
               <a:rPr lang="en-GB" smtClean="0"/>
-              <a:t>25/10/2022</a:t>
+              <a:t>26/10/2022</a:t>
             </a:fld>
             <a:endParaRPr lang="en-GB"/>
           </a:p>
@@ -1824,7 +1824,7 @@
           <a:p>
             <a:fld id="{335876D0-9B75-44B5-9404-8FDAD3FB5281}" type="datetimeFigureOut">
               <a:rPr lang="en-GB" smtClean="0"/>
-              <a:t>25/10/2022</a:t>
+              <a:t>26/10/2022</a:t>
             </a:fld>
             <a:endParaRPr lang="en-GB"/>
           </a:p>
@@ -2101,7 +2101,7 @@
           <a:p>
             <a:fld id="{335876D0-9B75-44B5-9404-8FDAD3FB5281}" type="datetimeFigureOut">
               <a:rPr lang="en-GB" smtClean="0"/>
-              <a:t>25/10/2022</a:t>
+              <a:t>26/10/2022</a:t>
             </a:fld>
             <a:endParaRPr lang="en-GB"/>
           </a:p>
@@ -2358,7 +2358,7 @@
           <a:p>
             <a:fld id="{335876D0-9B75-44B5-9404-8FDAD3FB5281}" type="datetimeFigureOut">
               <a:rPr lang="en-GB" smtClean="0"/>
-              <a:t>25/10/2022</a:t>
+              <a:t>26/10/2022</a:t>
             </a:fld>
             <a:endParaRPr lang="en-GB"/>
           </a:p>
@@ -2571,7 +2571,7 @@
           <a:p>
             <a:fld id="{335876D0-9B75-44B5-9404-8FDAD3FB5281}" type="datetimeFigureOut">
               <a:rPr lang="en-GB" smtClean="0"/>
-              <a:t>25/10/2022</a:t>
+              <a:t>26/10/2022</a:t>
             </a:fld>
             <a:endParaRPr lang="en-GB"/>
           </a:p>
@@ -3341,7 +3341,7 @@
                   <a:srgbClr val="262F3B"/>
                 </a:solidFill>
               </a:rPr>
-              <a:t>12 years of DevOps implementation, </a:t>
+              <a:t>12 years of DevOps experience</a:t>
             </a:r>
             <a:r>
               <a:rPr lang="en-GB" sz="1100" dirty="0">
@@ -3349,7 +3349,39 @@
                   <a:srgbClr val="262F3B"/>
                 </a:solidFill>
               </a:rPr>
-              <a:t>supporting customers to adopt tooling, process, and culture, to improve DORA metrics and business outcomes.</a:t>
+              <a:t>. Helps folks adopt/change tooling, process, and culture, to improve </a:t>
+            </a:r>
+            <a:r>
+              <a:rPr lang="en-GB" sz="1100" b="1" dirty="0">
+                <a:solidFill>
+                  <a:srgbClr val="262F3B"/>
+                </a:solidFill>
+              </a:rPr>
+              <a:t>DORA metrics </a:t>
+            </a:r>
+            <a:r>
+              <a:rPr lang="en-GB" sz="1100" dirty="0">
+                <a:solidFill>
+                  <a:srgbClr val="262F3B"/>
+                </a:solidFill>
+              </a:rPr>
+              <a:t>and deliver </a:t>
+            </a:r>
+            <a:r>
+              <a:rPr lang="en-GB" sz="1100" b="1" dirty="0">
+                <a:solidFill>
+                  <a:srgbClr val="262F3B"/>
+                </a:solidFill>
+              </a:rPr>
+              <a:t>better business outcomes</a:t>
+            </a:r>
+            <a:r>
+              <a:rPr lang="en-GB" sz="1100" dirty="0">
+                <a:solidFill>
+                  <a:srgbClr val="262F3B"/>
+                </a:solidFill>
+              </a:rPr>
+              <a:t>.</a:t>
             </a:r>
             <a:br>
               <a:rPr lang="en-GB" sz="1100" dirty="0">
@@ -3478,7 +3510,7 @@
                   <a:srgbClr val="262F3B"/>
                 </a:solidFill>
               </a:rPr>
-              <a:t>directing businesses</a:t>
+              <a:t>directing companies</a:t>
             </a:r>
             <a:r>
               <a:rPr lang="en-GB" sz="1100" dirty="0">
@@ -8580,7 +8612,7 @@
                 </a:solidFill>
                 <a:latin typeface="Gill Sans Nova" panose="020B0602020104020203" pitchFamily="34" charset="0"/>
               </a:rPr>
-              <a:t>Sales / Solutions Engineer: </a:t>
+              <a:t>Sales Person / Solutions Engineer: </a:t>
             </a:r>
             <a:r>
               <a:rPr lang="en-GB" sz="1100" b="1" dirty="0">
@@ -8649,7 +8681,7 @@
                   <a:srgbClr val="262F3B"/>
                 </a:solidFill>
               </a:rPr>
-              <a:t>Promoted to Solutions Engineer. Working with dev team on new product.</a:t>
+              <a:t>Promoted to Solutions Engineer. Worked with dev team on new products.</a:t>
             </a:r>
           </a:p>
           <a:p>
@@ -9594,10 +9626,10 @@
       </p:sp>
       <p:grpSp>
         <p:nvGrpSpPr>
-          <p:cNvPr id="11" name="Group 10">
+          <p:cNvPr id="10" name="Group 9">
             <a:extLst>
               <a:ext uri="{FF2B5EF4-FFF2-40B4-BE49-F238E27FC236}">
-                <a16:creationId xmlns:a16="http://schemas.microsoft.com/office/drawing/2014/main" id="{DA00A155-7B0A-9A4D-4C54-C254E34434D1}"/>
+                <a16:creationId xmlns:a16="http://schemas.microsoft.com/office/drawing/2014/main" id="{C0C039CA-EE86-084C-2A90-C43AD9ECC9FC}"/>
               </a:ext>
             </a:extLst>
           </p:cNvPr>
@@ -9606,368 +9638,347 @@
         </p:nvGrpSpPr>
         <p:grpSpPr>
           <a:xfrm>
-            <a:off x="142077" y="3569323"/>
-            <a:ext cx="6573846" cy="975360"/>
+            <a:off x="3491393" y="3569323"/>
+            <a:ext cx="3222153" cy="975360"/>
             <a:chOff x="206847" y="681427"/>
-            <a:chExt cx="6573846" cy="975360"/>
+            <a:chExt cx="3222153" cy="975360"/>
           </a:xfrm>
         </p:grpSpPr>
-        <p:grpSp>
-          <p:nvGrpSpPr>
-            <p:cNvPr id="10" name="Group 9">
+        <p:sp>
+          <p:nvSpPr>
+            <p:cNvPr id="6" name="Rectangle 5">
               <a:extLst>
                 <a:ext uri="{FF2B5EF4-FFF2-40B4-BE49-F238E27FC236}">
-                  <a16:creationId xmlns:a16="http://schemas.microsoft.com/office/drawing/2014/main" id="{C0C039CA-EE86-084C-2A90-C43AD9ECC9FC}"/>
+                  <a16:creationId xmlns:a16="http://schemas.microsoft.com/office/drawing/2014/main" id="{D06B4550-FBDE-2B5B-0771-464E107EB4D9}"/>
                 </a:ext>
               </a:extLst>
             </p:cNvPr>
-            <p:cNvGrpSpPr/>
+            <p:cNvSpPr/>
             <p:nvPr/>
-          </p:nvGrpSpPr>
-          <p:grpSpPr>
+          </p:nvSpPr>
+          <p:spPr>
             <a:xfrm>
-              <a:off x="206847" y="681427"/>
-              <a:ext cx="3222153" cy="975360"/>
-              <a:chOff x="206847" y="681427"/>
-              <a:chExt cx="3222153" cy="975360"/>
+              <a:off x="1150620" y="681427"/>
+              <a:ext cx="2278380" cy="975360"/>
             </a:xfrm>
-          </p:grpSpPr>
-          <p:sp>
-            <p:nvSpPr>
-              <p:cNvPr id="6" name="Rectangle 5">
-                <a:extLst>
-                  <a:ext uri="{FF2B5EF4-FFF2-40B4-BE49-F238E27FC236}">
-                    <a16:creationId xmlns:a16="http://schemas.microsoft.com/office/drawing/2014/main" id="{D06B4550-FBDE-2B5B-0771-464E107EB4D9}"/>
-                  </a:ext>
-                </a:extLst>
-              </p:cNvPr>
-              <p:cNvSpPr/>
-              <p:nvPr/>
-            </p:nvSpPr>
-            <p:spPr>
-              <a:xfrm>
-                <a:off x="1150620" y="681427"/>
-                <a:ext cx="2278380" cy="975360"/>
-              </a:xfrm>
-              <a:prstGeom prst="rect">
-                <a:avLst/>
-              </a:prstGeom>
-              <a:solidFill>
-                <a:srgbClr val="262F3B"/>
-              </a:solidFill>
-              <a:ln>
-                <a:noFill/>
-              </a:ln>
-            </p:spPr>
-            <p:style>
-              <a:lnRef idx="2">
-                <a:schemeClr val="accent1">
-                  <a:shade val="50000"/>
-                </a:schemeClr>
-              </a:lnRef>
-              <a:fillRef idx="1">
-                <a:schemeClr val="accent1"/>
-              </a:fillRef>
-              <a:effectRef idx="0">
-                <a:schemeClr val="accent1"/>
-              </a:effectRef>
-              <a:fontRef idx="minor">
-                <a:schemeClr val="lt1"/>
-              </a:fontRef>
-            </p:style>
-            <p:txBody>
-              <a:bodyPr rtlCol="0" anchor="ctr"/>
-              <a:lstStyle/>
-              <a:p>
-                <a:r>
-                  <a:rPr lang="en-GB" sz="1000" b="0" i="0" dirty="0">
-                    <a:solidFill>
-                      <a:schemeClr val="bg1"/>
-                    </a:solidFill>
-                    <a:effectLst/>
-                  </a:rPr>
-                  <a:t>Adopting DevOps involves making difficult, hard-to-reverse changes. You need someone who’s done this before, listens well, and communicates the right information. That person is Alex Yates.</a:t>
-                </a:r>
-              </a:p>
-              <a:p>
-                <a:r>
-                  <a:rPr lang="en-GB" sz="1000" b="1" dirty="0">
-                    <a:solidFill>
-                      <a:srgbClr val="F6AB25"/>
-                    </a:solidFill>
-                  </a:rPr>
-                  <a:t>B. Ozar</a:t>
-                </a:r>
-                <a:r>
-                  <a:rPr lang="en-GB" sz="1000" dirty="0">
-                    <a:solidFill>
-                      <a:srgbClr val="F6AB25"/>
-                    </a:solidFill>
-                  </a:rPr>
-                  <a:t>, </a:t>
-                </a:r>
-                <a:r>
-                  <a:rPr lang="en-GB" sz="900" dirty="0">
-                    <a:solidFill>
-                      <a:srgbClr val="F6AB25"/>
-                    </a:solidFill>
-                  </a:rPr>
-                  <a:t>Consultant, </a:t>
-                </a:r>
-                <a:r>
-                  <a:rPr lang="en-GB" sz="1000" dirty="0">
-                    <a:solidFill>
-                      <a:srgbClr val="F6AB25"/>
-                    </a:solidFill>
-                  </a:rPr>
-                  <a:t>Brent Ozar Unlimited</a:t>
-                </a:r>
-              </a:p>
-            </p:txBody>
-          </p:sp>
-          <p:sp>
-            <p:nvSpPr>
-              <p:cNvPr id="5" name="Oval 4">
-                <a:extLst>
-                  <a:ext uri="{FF2B5EF4-FFF2-40B4-BE49-F238E27FC236}">
-                    <a16:creationId xmlns:a16="http://schemas.microsoft.com/office/drawing/2014/main" id="{A316EF94-07A4-74B9-F8BE-048FC94DC4BE}"/>
-                  </a:ext>
-                </a:extLst>
-              </p:cNvPr>
-              <p:cNvSpPr/>
-              <p:nvPr/>
-            </p:nvSpPr>
-            <p:spPr>
-              <a:xfrm>
-                <a:off x="206847" y="681427"/>
-                <a:ext cx="975360" cy="975360"/>
-              </a:xfrm>
-              <a:prstGeom prst="ellipse">
-                <a:avLst/>
-              </a:prstGeom>
-              <a:blipFill dpi="0" rotWithShape="1">
-                <a:blip r:embed="rId2">
-                  <a:extLst>
-                    <a:ext uri="{28A0092B-C50C-407E-A947-70E740481C1C}">
-                      <a14:useLocalDpi xmlns:a14="http://schemas.microsoft.com/office/drawing/2010/main" val="0"/>
-                    </a:ext>
-                  </a:extLst>
-                </a:blip>
-                <a:srcRect/>
-                <a:stretch>
-                  <a:fillRect/>
-                </a:stretch>
-              </a:blipFill>
-              <a:ln w="57150">
-                <a:solidFill>
-                  <a:srgbClr val="F6AB25"/>
-                </a:solidFill>
-              </a:ln>
-            </p:spPr>
-            <p:style>
-              <a:lnRef idx="2">
-                <a:schemeClr val="accent1">
-                  <a:shade val="50000"/>
-                </a:schemeClr>
-              </a:lnRef>
-              <a:fillRef idx="1">
-                <a:schemeClr val="accent1"/>
-              </a:fillRef>
-              <a:effectRef idx="0">
-                <a:schemeClr val="accent1"/>
-              </a:effectRef>
-              <a:fontRef idx="minor">
-                <a:schemeClr val="lt1"/>
-              </a:fontRef>
-            </p:style>
-            <p:txBody>
-              <a:bodyPr rtlCol="0" anchor="ctr"/>
-              <a:lstStyle/>
-              <a:p>
-                <a:pPr algn="ctr"/>
-                <a:endParaRPr lang="en-GB"/>
-              </a:p>
-            </p:txBody>
-          </p:sp>
-        </p:grpSp>
-        <p:grpSp>
-          <p:nvGrpSpPr>
-            <p:cNvPr id="9" name="Group 8">
+            <a:prstGeom prst="rect">
+              <a:avLst/>
+            </a:prstGeom>
+            <a:solidFill>
+              <a:srgbClr val="262F3B"/>
+            </a:solidFill>
+            <a:ln>
+              <a:noFill/>
+            </a:ln>
+          </p:spPr>
+          <p:style>
+            <a:lnRef idx="2">
+              <a:schemeClr val="accent1">
+                <a:shade val="50000"/>
+              </a:schemeClr>
+            </a:lnRef>
+            <a:fillRef idx="1">
+              <a:schemeClr val="accent1"/>
+            </a:fillRef>
+            <a:effectRef idx="0">
+              <a:schemeClr val="accent1"/>
+            </a:effectRef>
+            <a:fontRef idx="minor">
+              <a:schemeClr val="lt1"/>
+            </a:fontRef>
+          </p:style>
+          <p:txBody>
+            <a:bodyPr rtlCol="0" anchor="ctr"/>
+            <a:lstStyle/>
+            <a:p>
+              <a:r>
+                <a:rPr lang="en-GB" sz="1000" b="0" i="0" dirty="0">
+                  <a:solidFill>
+                    <a:schemeClr val="bg1"/>
+                  </a:solidFill>
+                  <a:effectLst/>
+                </a:rPr>
+                <a:t>Adopting DevOps involves making difficult, hard-to-reverse changes. You need someone who’s done this before, listens well, and communicates the right information. That person is Alex Yates.</a:t>
+              </a:r>
+            </a:p>
+            <a:p>
+              <a:r>
+                <a:rPr lang="en-GB" sz="1000" b="1" dirty="0">
+                  <a:solidFill>
+                    <a:srgbClr val="F6AB25"/>
+                  </a:solidFill>
+                </a:rPr>
+                <a:t>B. Ozar</a:t>
+              </a:r>
+              <a:r>
+                <a:rPr lang="en-GB" sz="1000" dirty="0">
+                  <a:solidFill>
+                    <a:srgbClr val="F6AB25"/>
+                  </a:solidFill>
+                </a:rPr>
+                <a:t>, </a:t>
+              </a:r>
+              <a:r>
+                <a:rPr lang="en-GB" sz="900" dirty="0">
+                  <a:solidFill>
+                    <a:srgbClr val="F6AB25"/>
+                  </a:solidFill>
+                </a:rPr>
+                <a:t>Consultant, </a:t>
+              </a:r>
+              <a:r>
+                <a:rPr lang="en-GB" sz="1000" dirty="0">
+                  <a:solidFill>
+                    <a:srgbClr val="F6AB25"/>
+                  </a:solidFill>
+                </a:rPr>
+                <a:t>Brent Ozar Unlimited</a:t>
+              </a:r>
+            </a:p>
+          </p:txBody>
+        </p:sp>
+        <p:sp>
+          <p:nvSpPr>
+            <p:cNvPr id="5" name="Oval 4">
               <a:extLst>
                 <a:ext uri="{FF2B5EF4-FFF2-40B4-BE49-F238E27FC236}">
-                  <a16:creationId xmlns:a16="http://schemas.microsoft.com/office/drawing/2014/main" id="{9B3EA396-9A92-D29A-74FE-9715103ECB7A}"/>
+                  <a16:creationId xmlns:a16="http://schemas.microsoft.com/office/drawing/2014/main" id="{A316EF94-07A4-74B9-F8BE-048FC94DC4BE}"/>
                 </a:ext>
               </a:extLst>
             </p:cNvPr>
-            <p:cNvGrpSpPr/>
+            <p:cNvSpPr/>
             <p:nvPr/>
-          </p:nvGrpSpPr>
-          <p:grpSpPr>
+          </p:nvSpPr>
+          <p:spPr>
             <a:xfrm>
-              <a:off x="3558540" y="681427"/>
-              <a:ext cx="3222153" cy="975360"/>
-              <a:chOff x="3429000" y="681427"/>
-              <a:chExt cx="3222153" cy="975360"/>
+              <a:off x="206847" y="681427"/>
+              <a:ext cx="975360" cy="975360"/>
             </a:xfrm>
-          </p:grpSpPr>
-          <p:sp>
-            <p:nvSpPr>
-              <p:cNvPr id="7" name="Rectangle 6">
+            <a:prstGeom prst="ellipse">
+              <a:avLst/>
+            </a:prstGeom>
+            <a:blipFill dpi="0" rotWithShape="1">
+              <a:blip r:embed="rId2">
                 <a:extLst>
-                  <a:ext uri="{FF2B5EF4-FFF2-40B4-BE49-F238E27FC236}">
-                    <a16:creationId xmlns:a16="http://schemas.microsoft.com/office/drawing/2014/main" id="{9766F5E8-82CF-0E64-13A5-1FBEC72B72FB}"/>
+                  <a:ext uri="{28A0092B-C50C-407E-A947-70E740481C1C}">
+                    <a14:useLocalDpi xmlns:a14="http://schemas.microsoft.com/office/drawing/2010/main" val="0"/>
                   </a:ext>
                 </a:extLst>
-              </p:cNvPr>
-              <p:cNvSpPr/>
-              <p:nvPr/>
-            </p:nvSpPr>
-            <p:spPr>
-              <a:xfrm>
-                <a:off x="4372773" y="681427"/>
-                <a:ext cx="2278380" cy="975360"/>
-              </a:xfrm>
-              <a:prstGeom prst="rect">
-                <a:avLst/>
-              </a:prstGeom>
+              </a:blip>
+              <a:srcRect/>
+              <a:stretch>
+                <a:fillRect/>
+              </a:stretch>
+            </a:blipFill>
+            <a:ln w="57150">
               <a:solidFill>
-                <a:srgbClr val="262F3B"/>
+                <a:srgbClr val="F6AB25"/>
               </a:solidFill>
-              <a:ln>
-                <a:noFill/>
-              </a:ln>
-            </p:spPr>
-            <p:style>
-              <a:lnRef idx="2">
-                <a:schemeClr val="accent1">
-                  <a:shade val="50000"/>
-                </a:schemeClr>
-              </a:lnRef>
-              <a:fillRef idx="1">
-                <a:schemeClr val="accent1"/>
-              </a:fillRef>
-              <a:effectRef idx="0">
-                <a:schemeClr val="accent1"/>
-              </a:effectRef>
-              <a:fontRef idx="minor">
-                <a:schemeClr val="lt1"/>
-              </a:fontRef>
-            </p:style>
-            <p:txBody>
-              <a:bodyPr rtlCol="0" anchor="ctr"/>
-              <a:lstStyle/>
-              <a:p>
-                <a:r>
-                  <a:rPr lang="en-GB" sz="1000" b="0" i="0" dirty="0">
-                    <a:solidFill>
-                      <a:schemeClr val="bg1"/>
-                    </a:solidFill>
-                    <a:effectLst/>
-                  </a:rPr>
-                  <a:t>Our implementation of DLM ranks as the most beneficial infrastructure project of my 26-year IT career. DB deploys are no longer a bottleneck.</a:t>
-                </a:r>
-              </a:p>
-              <a:p>
-                <a:r>
-                  <a:rPr lang="en-GB" sz="1000" b="1" dirty="0">
-                    <a:solidFill>
-                      <a:srgbClr val="F6AB25"/>
-                    </a:solidFill>
-                  </a:rPr>
-                  <a:t>Steve Cornwell</a:t>
-                </a:r>
-                <a:r>
-                  <a:rPr lang="en-GB" sz="1000" dirty="0">
-                    <a:solidFill>
-                      <a:srgbClr val="F6AB25"/>
-                    </a:solidFill>
-                  </a:rPr>
-                  <a:t>, Architect,</a:t>
-                </a:r>
-                <a:r>
-                  <a:rPr lang="en-GB" sz="1000" b="1" dirty="0">
-                    <a:solidFill>
-                      <a:srgbClr val="F6AB25"/>
-                    </a:solidFill>
-                  </a:rPr>
-                  <a:t> Microsoft and </a:t>
-                </a:r>
-                <a:r>
-                  <a:rPr lang="en-GB" sz="1000" dirty="0">
-                    <a:solidFill>
-                      <a:srgbClr val="F6AB25"/>
-                    </a:solidFill>
-                  </a:rPr>
-                  <a:t>Farm Credit Mid-America</a:t>
-                </a:r>
-              </a:p>
-            </p:txBody>
-          </p:sp>
-          <p:sp>
-            <p:nvSpPr>
-              <p:cNvPr id="8" name="Oval 7">
+            </a:ln>
+          </p:spPr>
+          <p:style>
+            <a:lnRef idx="2">
+              <a:schemeClr val="accent1">
+                <a:shade val="50000"/>
+              </a:schemeClr>
+            </a:lnRef>
+            <a:fillRef idx="1">
+              <a:schemeClr val="accent1"/>
+            </a:fillRef>
+            <a:effectRef idx="0">
+              <a:schemeClr val="accent1"/>
+            </a:effectRef>
+            <a:fontRef idx="minor">
+              <a:schemeClr val="lt1"/>
+            </a:fontRef>
+          </p:style>
+          <p:txBody>
+            <a:bodyPr rtlCol="0" anchor="ctr"/>
+            <a:lstStyle/>
+            <a:p>
+              <a:pPr algn="ctr"/>
+              <a:endParaRPr lang="en-GB"/>
+            </a:p>
+          </p:txBody>
+        </p:sp>
+      </p:grpSp>
+      <p:grpSp>
+        <p:nvGrpSpPr>
+          <p:cNvPr id="9" name="Group 8">
+            <a:extLst>
+              <a:ext uri="{FF2B5EF4-FFF2-40B4-BE49-F238E27FC236}">
+                <a16:creationId xmlns:a16="http://schemas.microsoft.com/office/drawing/2014/main" id="{9B3EA396-9A92-D29A-74FE-9715103ECB7A}"/>
+              </a:ext>
+            </a:extLst>
+          </p:cNvPr>
+          <p:cNvGrpSpPr/>
+          <p:nvPr/>
+        </p:nvGrpSpPr>
+        <p:grpSpPr>
+          <a:xfrm>
+            <a:off x="142077" y="4627617"/>
+            <a:ext cx="3222153" cy="975360"/>
+            <a:chOff x="3429000" y="681427"/>
+            <a:chExt cx="3222153" cy="975360"/>
+          </a:xfrm>
+        </p:grpSpPr>
+        <p:sp>
+          <p:nvSpPr>
+            <p:cNvPr id="7" name="Rectangle 6">
+              <a:extLst>
+                <a:ext uri="{FF2B5EF4-FFF2-40B4-BE49-F238E27FC236}">
+                  <a16:creationId xmlns:a16="http://schemas.microsoft.com/office/drawing/2014/main" id="{9766F5E8-82CF-0E64-13A5-1FBEC72B72FB}"/>
+                </a:ext>
+              </a:extLst>
+            </p:cNvPr>
+            <p:cNvSpPr/>
+            <p:nvPr/>
+          </p:nvSpPr>
+          <p:spPr>
+            <a:xfrm>
+              <a:off x="4372773" y="681427"/>
+              <a:ext cx="2278380" cy="975360"/>
+            </a:xfrm>
+            <a:prstGeom prst="rect">
+              <a:avLst/>
+            </a:prstGeom>
+            <a:solidFill>
+              <a:srgbClr val="262F3B"/>
+            </a:solidFill>
+            <a:ln>
+              <a:noFill/>
+            </a:ln>
+          </p:spPr>
+          <p:style>
+            <a:lnRef idx="2">
+              <a:schemeClr val="accent1">
+                <a:shade val="50000"/>
+              </a:schemeClr>
+            </a:lnRef>
+            <a:fillRef idx="1">
+              <a:schemeClr val="accent1"/>
+            </a:fillRef>
+            <a:effectRef idx="0">
+              <a:schemeClr val="accent1"/>
+            </a:effectRef>
+            <a:fontRef idx="minor">
+              <a:schemeClr val="lt1"/>
+            </a:fontRef>
+          </p:style>
+          <p:txBody>
+            <a:bodyPr rtlCol="0" anchor="ctr"/>
+            <a:lstStyle/>
+            <a:p>
+              <a:r>
+                <a:rPr lang="en-GB" sz="1000" b="0" i="0" dirty="0">
+                  <a:solidFill>
+                    <a:schemeClr val="bg1"/>
+                  </a:solidFill>
+                  <a:effectLst/>
+                </a:rPr>
+                <a:t>Our implementation of DLM ranks as the most beneficial infrastructure project of my 26-year IT career. DB deploys are no longer a bottleneck.</a:t>
+              </a:r>
+            </a:p>
+            <a:p>
+              <a:r>
+                <a:rPr lang="en-GB" sz="1000" b="1" dirty="0">
+                  <a:solidFill>
+                    <a:srgbClr val="F6AB25"/>
+                  </a:solidFill>
+                </a:rPr>
+                <a:t>Steve Cornwell</a:t>
+              </a:r>
+              <a:r>
+                <a:rPr lang="en-GB" sz="1000" dirty="0">
+                  <a:solidFill>
+                    <a:srgbClr val="F6AB25"/>
+                  </a:solidFill>
+                </a:rPr>
+                <a:t>, Architect,</a:t>
+              </a:r>
+              <a:r>
+                <a:rPr lang="en-GB" sz="1000" b="1" dirty="0">
+                  <a:solidFill>
+                    <a:srgbClr val="F6AB25"/>
+                  </a:solidFill>
+                </a:rPr>
+                <a:t> Microsoft </a:t>
+              </a:r>
+              <a:r>
+                <a:rPr lang="en-GB" sz="1000" dirty="0">
+                  <a:solidFill>
+                    <a:srgbClr val="F6AB25"/>
+                  </a:solidFill>
+                </a:rPr>
+                <a:t>and Farm Credit Mid-America</a:t>
+              </a:r>
+            </a:p>
+          </p:txBody>
+        </p:sp>
+        <p:sp>
+          <p:nvSpPr>
+            <p:cNvPr id="8" name="Oval 7">
+              <a:extLst>
+                <a:ext uri="{FF2B5EF4-FFF2-40B4-BE49-F238E27FC236}">
+                  <a16:creationId xmlns:a16="http://schemas.microsoft.com/office/drawing/2014/main" id="{B31EC5BC-C341-CA19-7F8D-B1DB2CA517C7}"/>
+                </a:ext>
+              </a:extLst>
+            </p:cNvPr>
+            <p:cNvSpPr/>
+            <p:nvPr/>
+          </p:nvSpPr>
+          <p:spPr>
+            <a:xfrm>
+              <a:off x="3429000" y="681427"/>
+              <a:ext cx="975360" cy="975360"/>
+            </a:xfrm>
+            <a:prstGeom prst="ellipse">
+              <a:avLst/>
+            </a:prstGeom>
+            <a:blipFill dpi="0" rotWithShape="1">
+              <a:blip r:embed="rId3">
                 <a:extLst>
-                  <a:ext uri="{FF2B5EF4-FFF2-40B4-BE49-F238E27FC236}">
-                    <a16:creationId xmlns:a16="http://schemas.microsoft.com/office/drawing/2014/main" id="{B31EC5BC-C341-CA19-7F8D-B1DB2CA517C7}"/>
+                  <a:ext uri="{28A0092B-C50C-407E-A947-70E740481C1C}">
+                    <a14:useLocalDpi xmlns:a14="http://schemas.microsoft.com/office/drawing/2010/main" val="0"/>
                   </a:ext>
                 </a:extLst>
-              </p:cNvPr>
-              <p:cNvSpPr/>
-              <p:nvPr/>
-            </p:nvSpPr>
-            <p:spPr>
-              <a:xfrm>
-                <a:off x="3429000" y="681427"/>
-                <a:ext cx="975360" cy="975360"/>
-              </a:xfrm>
-              <a:prstGeom prst="ellipse">
-                <a:avLst/>
-              </a:prstGeom>
-              <a:blipFill dpi="0" rotWithShape="1">
-                <a:blip r:embed="rId3">
-                  <a:extLst>
-                    <a:ext uri="{28A0092B-C50C-407E-A947-70E740481C1C}">
-                      <a14:useLocalDpi xmlns:a14="http://schemas.microsoft.com/office/drawing/2010/main" val="0"/>
-                    </a:ext>
-                  </a:extLst>
-                </a:blip>
-                <a:srcRect/>
-                <a:stretch>
-                  <a:fillRect/>
-                </a:stretch>
-              </a:blipFill>
-              <a:ln w="57150">
-                <a:solidFill>
-                  <a:srgbClr val="F6AB25"/>
-                </a:solidFill>
-              </a:ln>
-            </p:spPr>
-            <p:style>
-              <a:lnRef idx="2">
-                <a:schemeClr val="accent1">
-                  <a:shade val="50000"/>
-                </a:schemeClr>
-              </a:lnRef>
-              <a:fillRef idx="1">
-                <a:schemeClr val="accent1"/>
-              </a:fillRef>
-              <a:effectRef idx="0">
-                <a:schemeClr val="accent1"/>
-              </a:effectRef>
-              <a:fontRef idx="minor">
-                <a:schemeClr val="lt1"/>
-              </a:fontRef>
-            </p:style>
-            <p:txBody>
-              <a:bodyPr rtlCol="0" anchor="ctr"/>
-              <a:lstStyle/>
-              <a:p>
-                <a:pPr algn="ctr"/>
-                <a:endParaRPr lang="en-GB"/>
-              </a:p>
-            </p:txBody>
-          </p:sp>
-        </p:grpSp>
+              </a:blip>
+              <a:srcRect/>
+              <a:stretch>
+                <a:fillRect/>
+              </a:stretch>
+            </a:blipFill>
+            <a:ln w="57150">
+              <a:solidFill>
+                <a:srgbClr val="F6AB25"/>
+              </a:solidFill>
+            </a:ln>
+          </p:spPr>
+          <p:style>
+            <a:lnRef idx="2">
+              <a:schemeClr val="accent1">
+                <a:shade val="50000"/>
+              </a:schemeClr>
+            </a:lnRef>
+            <a:fillRef idx="1">
+              <a:schemeClr val="accent1"/>
+            </a:fillRef>
+            <a:effectRef idx="0">
+              <a:schemeClr val="accent1"/>
+            </a:effectRef>
+            <a:fontRef idx="minor">
+              <a:schemeClr val="lt1"/>
+            </a:fontRef>
+          </p:style>
+          <p:txBody>
+            <a:bodyPr rtlCol="0" anchor="ctr"/>
+            <a:lstStyle/>
+            <a:p>
+              <a:pPr algn="ctr"/>
+              <a:endParaRPr lang="en-GB"/>
+            </a:p>
+          </p:txBody>
+        </p:sp>
       </p:grpSp>
       <p:grpSp>
         <p:nvGrpSpPr>
@@ -9983,7 +9994,7 @@
         </p:nvGrpSpPr>
         <p:grpSpPr>
           <a:xfrm>
-            <a:off x="142077" y="4627617"/>
+            <a:off x="3491393" y="4634351"/>
             <a:ext cx="3222153" cy="975360"/>
             <a:chOff x="206847" y="681427"/>
             <a:chExt cx="3222153" cy="975360"/>
@@ -10158,7 +10169,7 @@
         </p:nvGrpSpPr>
         <p:grpSpPr>
           <a:xfrm>
-            <a:off x="3493770" y="2511029"/>
+            <a:off x="142077" y="2511029"/>
             <a:ext cx="3222153" cy="975360"/>
             <a:chOff x="3429000" y="681427"/>
             <a:chExt cx="3222153" cy="975360"/>
@@ -10904,7 +10915,7 @@
         </p:nvGrpSpPr>
         <p:grpSpPr>
           <a:xfrm>
-            <a:off x="3493770" y="4627617"/>
+            <a:off x="3491393" y="5685911"/>
             <a:ext cx="3222153" cy="975360"/>
             <a:chOff x="3429000" y="681427"/>
             <a:chExt cx="3222153" cy="975360"/>
@@ -11073,7 +11084,7 @@
         </p:nvGrpSpPr>
         <p:grpSpPr>
           <a:xfrm>
-            <a:off x="3482177" y="6744205"/>
+            <a:off x="3479800" y="7802499"/>
             <a:ext cx="3222153" cy="975360"/>
             <a:chOff x="206847" y="681427"/>
             <a:chExt cx="3222153" cy="975360"/>
@@ -11243,7 +11254,7 @@
         </p:nvGrpSpPr>
         <p:grpSpPr>
           <a:xfrm>
-            <a:off x="3493770" y="5685911"/>
+            <a:off x="3491393" y="6744205"/>
             <a:ext cx="3222153" cy="975360"/>
             <a:chOff x="3429000" y="681427"/>
             <a:chExt cx="3222153" cy="975360"/>
@@ -11412,7 +11423,7 @@
         </p:nvGrpSpPr>
         <p:grpSpPr>
           <a:xfrm>
-            <a:off x="3493770" y="7796270"/>
+            <a:off x="3493770" y="2511029"/>
             <a:ext cx="3222153" cy="975360"/>
             <a:chOff x="206847" y="681427"/>
             <a:chExt cx="3222153" cy="975360"/>
@@ -11543,7 +11554,7 @@
             </a:blipFill>
             <a:ln w="57150">
               <a:solidFill>
-                <a:srgbClr val="F6AB25"/>
+                <a:srgbClr val="CC0000"/>
               </a:solidFill>
             </a:ln>
           </p:spPr>
@@ -12190,7 +12201,7 @@
         </p:nvGrpSpPr>
         <p:grpSpPr>
           <a:xfrm>
-            <a:off x="142077" y="2511029"/>
+            <a:off x="142077" y="3569323"/>
             <a:ext cx="3222153" cy="975360"/>
             <a:chOff x="206847" y="681427"/>
             <a:chExt cx="3222153" cy="975360"/>

</xml_diff>